<commit_message>
Added link to github in presentation
</commit_message>
<xml_diff>
--- a/WPF Tutorial.pptx
+++ b/WPF Tutorial.pptx
@@ -119,6 +119,14 @@
       </a:defRPr>
     </a:lvl9pPr>
   </p:defaultTextStyle>
+  <p:extLst>
+    <p:ext uri="{EFAFB233-063F-42B5-8137-9DF3F51BA10A}">
+      <p15:sldGuideLst xmlns:p15="http://schemas.microsoft.com/office/powerpoint/2012/main"/>
+    </p:ext>
+    <p:ext uri="{2D200454-40CA-4A62-9FC3-DE9A4176ACB9}">
+      <p15:notesGuideLst xmlns:p15="http://schemas.microsoft.com/office/powerpoint/2012/main"/>
+    </p:ext>
+  </p:extLst>
 </p:presentation>
 </file>
 
@@ -204,7 +212,7 @@
           <a:p>
             <a:fld id="{91D91F78-A215-4E5C-82B1-5ED153E4DA0A}" type="datetimeFigureOut">
               <a:rPr lang="de-DE" smtClean="0"/>
-              <a:t>04.10.2017</a:t>
+              <a:t>05.10.2017</a:t>
             </a:fld>
             <a:endParaRPr lang="de-DE"/>
           </a:p>
@@ -369,7 +377,7 @@
           <a:p>
             <a:fld id="{18C34F21-CDAD-4E93-B503-AE44CCBEDB3F}" type="datetimeFigureOut">
               <a:rPr lang="de-DE" smtClean="0"/>
-              <a:t>04.10.2017</a:t>
+              <a:t>05.10.2017</a:t>
             </a:fld>
             <a:endParaRPr lang="de-DE"/>
           </a:p>
@@ -1695,7 +1703,7 @@
             <a:fld id="{87DE6118-2437-4B30-8E3C-4D2BE6020583}" type="datetimeFigureOut">
               <a:rPr lang="en-US" dirty="0"/>
               <a:pPr/>
-              <a:t>10/4/2017</a:t>
+              <a:t>10/5/2017</a:t>
             </a:fld>
             <a:endParaRPr lang="en-US" dirty="0"/>
           </a:p>
@@ -2021,7 +2029,7 @@
           <a:p>
             <a:fld id="{87DE6118-2437-4B30-8E3C-4D2BE6020583}" type="datetimeFigureOut">
               <a:rPr lang="en-US" dirty="0"/>
-              <a:t>10/4/2017</a:t>
+              <a:t>10/5/2017</a:t>
             </a:fld>
             <a:endParaRPr lang="en-US" dirty="0"/>
           </a:p>
@@ -2196,7 +2204,7 @@
           <a:p>
             <a:fld id="{87DE6118-2437-4B30-8E3C-4D2BE6020583}" type="datetimeFigureOut">
               <a:rPr lang="en-US" dirty="0"/>
-              <a:t>10/4/2017</a:t>
+              <a:t>10/5/2017</a:t>
             </a:fld>
             <a:endParaRPr lang="en-US" dirty="0"/>
           </a:p>
@@ -2361,7 +2369,7 @@
           <a:p>
             <a:fld id="{87DE6118-2437-4B30-8E3C-4D2BE6020583}" type="datetimeFigureOut">
               <a:rPr lang="en-US" dirty="0"/>
-              <a:t>10/4/2017</a:t>
+              <a:t>10/5/2017</a:t>
             </a:fld>
             <a:endParaRPr lang="en-US" dirty="0"/>
           </a:p>
@@ -2634,7 +2642,7 @@
             <a:fld id="{87DE6118-2437-4B30-8E3C-4D2BE6020583}" type="datetimeFigureOut">
               <a:rPr lang="en-US" dirty="0"/>
               <a:pPr/>
-              <a:t>10/4/2017</a:t>
+              <a:t>10/5/2017</a:t>
             </a:fld>
             <a:endParaRPr lang="en-US" dirty="0"/>
           </a:p>
@@ -3024,7 +3032,7 @@
           <a:p>
             <a:fld id="{87DE6118-2437-4B30-8E3C-4D2BE6020583}" type="datetimeFigureOut">
               <a:rPr lang="en-US" dirty="0"/>
-              <a:t>10/4/2017</a:t>
+              <a:t>10/5/2017</a:t>
             </a:fld>
             <a:endParaRPr lang="en-US" dirty="0"/>
           </a:p>
@@ -3496,7 +3504,7 @@
           <a:p>
             <a:fld id="{87DE6118-2437-4B30-8E3C-4D2BE6020583}" type="datetimeFigureOut">
               <a:rPr lang="en-US" dirty="0"/>
-              <a:t>10/4/2017</a:t>
+              <a:t>10/5/2017</a:t>
             </a:fld>
             <a:endParaRPr lang="en-US" dirty="0"/>
           </a:p>
@@ -3609,7 +3617,7 @@
           <a:p>
             <a:fld id="{87DE6118-2437-4B30-8E3C-4D2BE6020583}" type="datetimeFigureOut">
               <a:rPr lang="en-US" dirty="0"/>
-              <a:t>10/4/2017</a:t>
+              <a:t>10/5/2017</a:t>
             </a:fld>
             <a:endParaRPr lang="en-US" dirty="0"/>
           </a:p>
@@ -3699,7 +3707,7 @@
           <a:p>
             <a:fld id="{87DE6118-2437-4B30-8E3C-4D2BE6020583}" type="datetimeFigureOut">
               <a:rPr lang="en-US" dirty="0"/>
-              <a:t>10/4/2017</a:t>
+              <a:t>10/5/2017</a:t>
             </a:fld>
             <a:endParaRPr lang="en-US" dirty="0"/>
           </a:p>
@@ -4052,7 +4060,7 @@
             <a:fld id="{87DE6118-2437-4B30-8E3C-4D2BE6020583}" type="datetimeFigureOut">
               <a:rPr lang="en-US" dirty="0"/>
               <a:pPr/>
-              <a:t>10/4/2017</a:t>
+              <a:t>10/5/2017</a:t>
             </a:fld>
             <a:endParaRPr lang="en-US" dirty="0"/>
           </a:p>
@@ -4437,7 +4445,7 @@
             <a:fld id="{87DE6118-2437-4B30-8E3C-4D2BE6020583}" type="datetimeFigureOut">
               <a:rPr lang="en-US" dirty="0"/>
               <a:pPr/>
-              <a:t>10/4/2017</a:t>
+              <a:t>10/5/2017</a:t>
             </a:fld>
             <a:endParaRPr lang="en-US" dirty="0"/>
           </a:p>
@@ -4712,7 +4720,7 @@
             <a:fld id="{87DE6118-2437-4B30-8E3C-4D2BE6020583}" type="datetimeFigureOut">
               <a:rPr lang="en-US" dirty="0"/>
               <a:pPr/>
-              <a:t>10/4/2017</a:t>
+              <a:t>10/5/2017</a:t>
             </a:fld>
             <a:endParaRPr lang="en-US" dirty="0"/>
           </a:p>
@@ -6378,7 +6386,67 @@
               </a:rPr>
               <a:t>www.andreaslennartz.de</a:t>
             </a:r>
-            <a:endParaRPr lang="de-DE" dirty="0"/>
+            <a:endParaRPr lang="de-DE" dirty="0" smtClean="0"/>
+          </a:p>
+          <a:p>
+            <a:r>
+              <a:rPr lang="de-DE" dirty="0" err="1" smtClean="0"/>
+              <a:t>Slides</a:t>
+            </a:r>
+            <a:r>
+              <a:rPr lang="de-DE" dirty="0" smtClean="0"/>
+              <a:t> </a:t>
+            </a:r>
+            <a:r>
+              <a:rPr lang="de-DE" dirty="0" err="1" smtClean="0"/>
+              <a:t>and</a:t>
+            </a:r>
+            <a:r>
+              <a:rPr lang="de-DE" dirty="0" smtClean="0"/>
+              <a:t> Code </a:t>
+            </a:r>
+            <a:r>
+              <a:rPr lang="de-DE" dirty="0" err="1" smtClean="0"/>
+              <a:t>of</a:t>
+            </a:r>
+            <a:r>
+              <a:rPr lang="de-DE" dirty="0" smtClean="0"/>
+              <a:t> </a:t>
+            </a:r>
+            <a:r>
+              <a:rPr lang="de-DE" dirty="0" err="1" smtClean="0"/>
+              <a:t>this</a:t>
+            </a:r>
+            <a:r>
+              <a:rPr lang="de-DE" dirty="0" smtClean="0"/>
+              <a:t> </a:t>
+            </a:r>
+            <a:r>
+              <a:rPr lang="de-DE" dirty="0" err="1" smtClean="0"/>
+              <a:t>presentation</a:t>
+            </a:r>
+            <a:r>
+              <a:rPr lang="de-DE" dirty="0" smtClean="0"/>
+              <a:t> on </a:t>
+            </a:r>
+            <a:r>
+              <a:rPr lang="de-DE" dirty="0" err="1" smtClean="0"/>
+              <a:t>GitHub</a:t>
+            </a:r>
+            <a:r>
+              <a:rPr lang="de-DE" dirty="0" smtClean="0"/>
+              <a:t>:</a:t>
+            </a:r>
+          </a:p>
+          <a:p>
+            <a:pPr lvl="1"/>
+            <a:r>
+              <a:rPr lang="de-DE" sz="1600" dirty="0">
+                <a:hlinkClick r:id="rId4"/>
+              </a:rPr>
+              <a:t>https://github.com/roadrunnerlenny/wpftutorial.git</a:t>
+            </a:r>
+            <a:endParaRPr lang="de-DE" sz="1600" dirty="0"/>
           </a:p>
           <a:p>
             <a:pPr lvl="1"/>
@@ -6407,7 +6475,7 @@
           <p:nvPr/>
         </p:nvPicPr>
         <p:blipFill>
-          <a:blip r:embed="rId4">
+          <a:blip r:embed="rId5">
             <a:extLst>
               <a:ext uri="{28A0092B-C50C-407E-A947-70E740481C1C}">
                 <a14:useLocalDpi xmlns:a14="http://schemas.microsoft.com/office/drawing/2010/main" val="0"/>
@@ -6476,7 +6544,7 @@
           <p:nvPr/>
         </p:nvPicPr>
         <p:blipFill>
-          <a:blip r:embed="rId5"/>
+          <a:blip r:embed="rId6"/>
           <a:stretch>
             <a:fillRect/>
           </a:stretch>

</xml_diff>